<commit_message>
add xdn animation to xdn.html
</commit_message>
<xml_diff>
--- a/source-figure.pptx
+++ b/source-figure.pptx
@@ -7,7 +7,8 @@
   <p:sldIdLst>
     <p:sldId id="256" r:id="rId2"/>
     <p:sldId id="257" r:id="rId3"/>
-    <p:sldId id="258" r:id="rId4"/>
+    <p:sldId id="259" r:id="rId4"/>
+    <p:sldId id="258" r:id="rId5"/>
   </p:sldIdLst>
   <p:sldSz cx="12192000" cy="6858000"/>
   <p:notesSz cx="6858000" cy="9144000"/>
@@ -2968,7 +2969,7 @@
       </p:grpSpPr>
       <p:pic>
         <p:nvPicPr>
-          <p:cNvPr id="4" name="Picture 3"/>
+          <p:cNvPr id="10" name="Picture 9"/>
           <p:cNvPicPr>
             <a:picLocks noChangeAspect="1"/>
           </p:cNvPicPr>
@@ -2988,8 +2989,38 @@
         </p:blipFill>
         <p:spPr>
           <a:xfrm>
-            <a:off x="4561272" y="2343150"/>
-            <a:ext cx="1963902" cy="1963902"/>
+            <a:off x="8353709" y="1702785"/>
+            <a:ext cx="3416300" cy="2552700"/>
+          </a:xfrm>
+          <a:prstGeom prst="rect">
+            <a:avLst/>
+          </a:prstGeom>
+        </p:spPr>
+      </p:pic>
+      <p:pic>
+        <p:nvPicPr>
+          <p:cNvPr id="7" name="Picture 6"/>
+          <p:cNvPicPr>
+            <a:picLocks noChangeAspect="1"/>
+          </p:cNvPicPr>
+          <p:nvPr/>
+        </p:nvPicPr>
+        <p:blipFill>
+          <a:blip r:embed="rId2">
+            <a:extLst>
+              <a:ext uri="{28A0092B-C50C-407E-A947-70E740481C1C}">
+                <a14:useLocalDpi xmlns:a14="http://schemas.microsoft.com/office/drawing/2010/main" val="0"/>
+              </a:ext>
+            </a:extLst>
+          </a:blip>
+          <a:stretch>
+            <a:fillRect/>
+          </a:stretch>
+        </p:blipFill>
+        <p:spPr>
+          <a:xfrm>
+            <a:off x="3952284" y="3880507"/>
+            <a:ext cx="3416300" cy="2552700"/>
           </a:xfrm>
           <a:prstGeom prst="rect">
             <a:avLst/>
@@ -3017,9 +3048,39 @@
           </a:stretch>
         </p:blipFill>
         <p:spPr>
-          <a:xfrm flipH="1">
-            <a:off x="6873457" y="2104259"/>
-            <a:ext cx="1657602" cy="2202793"/>
+          <a:xfrm>
+            <a:off x="8464068" y="1564126"/>
+            <a:ext cx="806056" cy="1071171"/>
+          </a:xfrm>
+          <a:prstGeom prst="rect">
+            <a:avLst/>
+          </a:prstGeom>
+        </p:spPr>
+      </p:pic>
+      <p:pic>
+        <p:nvPicPr>
+          <p:cNvPr id="9" name="Picture 8"/>
+          <p:cNvPicPr>
+            <a:picLocks noChangeAspect="1"/>
+          </p:cNvPicPr>
+          <p:nvPr/>
+        </p:nvPicPr>
+        <p:blipFill>
+          <a:blip r:embed="rId2">
+            <a:extLst>
+              <a:ext uri="{28A0092B-C50C-407E-A947-70E740481C1C}">
+                <a14:useLocalDpi xmlns:a14="http://schemas.microsoft.com/office/drawing/2010/main" val="0"/>
+              </a:ext>
+            </a:extLst>
+          </a:blip>
+          <a:stretch>
+            <a:fillRect/>
+          </a:stretch>
+        </p:blipFill>
+        <p:spPr>
+          <a:xfrm>
+            <a:off x="1019247" y="1702785"/>
+            <a:ext cx="3416300" cy="2552700"/>
           </a:xfrm>
           <a:prstGeom prst="rect">
             <a:avLst/>
@@ -3048,8 +3109,38 @@
         </p:blipFill>
         <p:spPr>
           <a:xfrm>
-            <a:off x="2291911" y="2245601"/>
-            <a:ext cx="2159000" cy="2159000"/>
+            <a:off x="893123" y="1315983"/>
+            <a:ext cx="1466302" cy="1466302"/>
+          </a:xfrm>
+          <a:prstGeom prst="rect">
+            <a:avLst/>
+          </a:prstGeom>
+        </p:spPr>
+      </p:pic>
+      <p:pic>
+        <p:nvPicPr>
+          <p:cNvPr id="8" name="Picture 7"/>
+          <p:cNvPicPr>
+            <a:picLocks noChangeAspect="1"/>
+          </p:cNvPicPr>
+          <p:nvPr/>
+        </p:nvPicPr>
+        <p:blipFill>
+          <a:blip r:embed="rId5">
+            <a:extLst>
+              <a:ext uri="{28A0092B-C50C-407E-A947-70E740481C1C}">
+                <a14:useLocalDpi xmlns:a14="http://schemas.microsoft.com/office/drawing/2010/main" val="0"/>
+              </a:ext>
+            </a:extLst>
+          </a:blip>
+          <a:stretch>
+            <a:fillRect/>
+          </a:stretch>
+        </p:blipFill>
+        <p:spPr>
+          <a:xfrm>
+            <a:off x="3995915" y="3541271"/>
+            <a:ext cx="1270767" cy="1270767"/>
           </a:xfrm>
           <a:prstGeom prst="rect">
             <a:avLst/>
@@ -3396,6 +3487,326 @@
 </file>
 
 <file path=ppt/slides/slide3.xml><?xml version="1.0" encoding="utf-8"?>
+<p:sld xmlns:a="http://schemas.openxmlformats.org/drawingml/2006/main" xmlns:r="http://schemas.openxmlformats.org/officeDocument/2006/relationships" xmlns:p="http://schemas.openxmlformats.org/presentationml/2006/main">
+  <p:cSld>
+    <p:spTree>
+      <p:nvGrpSpPr>
+        <p:cNvPr id="1" name=""/>
+        <p:cNvGrpSpPr/>
+        <p:nvPr/>
+      </p:nvGrpSpPr>
+      <p:grpSpPr>
+        <a:xfrm>
+          <a:off x="0" y="0"/>
+          <a:ext cx="0" cy="0"/>
+          <a:chOff x="0" y="0"/>
+          <a:chExt cx="0" cy="0"/>
+        </a:xfrm>
+      </p:grpSpPr>
+      <p:pic>
+        <p:nvPicPr>
+          <p:cNvPr id="4" name="Picture 3"/>
+          <p:cNvPicPr>
+            <a:picLocks noChangeAspect="1"/>
+          </p:cNvPicPr>
+          <p:nvPr/>
+        </p:nvPicPr>
+        <p:blipFill>
+          <a:blip r:embed="rId2">
+            <a:extLst>
+              <a:ext uri="{28A0092B-C50C-407E-A947-70E740481C1C}">
+                <a14:useLocalDpi xmlns:a14="http://schemas.microsoft.com/office/drawing/2010/main" val="0"/>
+              </a:ext>
+            </a:extLst>
+          </a:blip>
+          <a:stretch>
+            <a:fillRect/>
+          </a:stretch>
+        </p:blipFill>
+        <p:spPr>
+          <a:xfrm>
+            <a:off x="0" y="2516168"/>
+            <a:ext cx="2025162" cy="1605258"/>
+          </a:xfrm>
+          <a:prstGeom prst="rect">
+            <a:avLst/>
+          </a:prstGeom>
+        </p:spPr>
+      </p:pic>
+      <p:pic>
+        <p:nvPicPr>
+          <p:cNvPr id="5" name="Picture 4"/>
+          <p:cNvPicPr>
+            <a:picLocks noChangeAspect="1"/>
+          </p:cNvPicPr>
+          <p:nvPr/>
+        </p:nvPicPr>
+        <p:blipFill>
+          <a:blip r:embed="rId3">
+            <a:alphaModFix amt="60000"/>
+            <a:extLst>
+              <a:ext uri="{28A0092B-C50C-407E-A947-70E740481C1C}">
+                <a14:useLocalDpi xmlns:a14="http://schemas.microsoft.com/office/drawing/2010/main" val="0"/>
+              </a:ext>
+            </a:extLst>
+          </a:blip>
+          <a:stretch>
+            <a:fillRect/>
+          </a:stretch>
+        </p:blipFill>
+        <p:spPr>
+          <a:xfrm>
+            <a:off x="8335617" y="1842050"/>
+            <a:ext cx="3657600" cy="2438400"/>
+          </a:xfrm>
+          <a:prstGeom prst="rect">
+            <a:avLst/>
+          </a:prstGeom>
+          <a:noFill/>
+        </p:spPr>
+      </p:pic>
+      <p:sp>
+        <p:nvSpPr>
+          <p:cNvPr id="9" name="TextBox 8"/>
+          <p:cNvSpPr txBox="1"/>
+          <p:nvPr/>
+        </p:nvSpPr>
+        <p:spPr>
+          <a:xfrm>
+            <a:off x="8335616" y="4318510"/>
+            <a:ext cx="3015555" cy="646331"/>
+          </a:xfrm>
+          <a:prstGeom prst="rect">
+            <a:avLst/>
+          </a:prstGeom>
+          <a:noFill/>
+        </p:spPr>
+        <p:txBody>
+          <a:bodyPr wrap="square" rtlCol="0">
+            <a:spAutoFit/>
+          </a:bodyPr>
+          <a:lstStyle/>
+          <a:p>
+            <a:r>
+              <a:rPr lang="en-US" sz="3600" smtClean="0"/>
+              <a:t>Data center</a:t>
+            </a:r>
+            <a:endParaRPr lang="en-US" sz="3600"/>
+          </a:p>
+        </p:txBody>
+      </p:sp>
+      <p:pic>
+        <p:nvPicPr>
+          <p:cNvPr id="11" name="Picture 10"/>
+          <p:cNvPicPr>
+            <a:picLocks noChangeAspect="1"/>
+          </p:cNvPicPr>
+          <p:nvPr/>
+        </p:nvPicPr>
+        <p:blipFill>
+          <a:blip r:embed="rId4">
+            <a:extLst>
+              <a:ext uri="{28A0092B-C50C-407E-A947-70E740481C1C}">
+                <a14:useLocalDpi xmlns:a14="http://schemas.microsoft.com/office/drawing/2010/main" val="0"/>
+              </a:ext>
+            </a:extLst>
+          </a:blip>
+          <a:stretch>
+            <a:fillRect/>
+          </a:stretch>
+        </p:blipFill>
+        <p:spPr>
+          <a:xfrm>
+            <a:off x="4985121" y="1842050"/>
+            <a:ext cx="3108960" cy="2642616"/>
+          </a:xfrm>
+          <a:prstGeom prst="rect">
+            <a:avLst/>
+          </a:prstGeom>
+        </p:spPr>
+      </p:pic>
+      <p:sp>
+        <p:nvSpPr>
+          <p:cNvPr id="12" name="TextBox 11"/>
+          <p:cNvSpPr txBox="1"/>
+          <p:nvPr/>
+        </p:nvSpPr>
+        <p:spPr>
+          <a:xfrm>
+            <a:off x="5715935" y="3520269"/>
+            <a:ext cx="1961872" cy="646331"/>
+          </a:xfrm>
+          <a:prstGeom prst="rect">
+            <a:avLst/>
+          </a:prstGeom>
+          <a:noFill/>
+        </p:spPr>
+        <p:txBody>
+          <a:bodyPr wrap="square" rtlCol="0">
+            <a:spAutoFit/>
+          </a:bodyPr>
+          <a:lstStyle/>
+          <a:p>
+            <a:r>
+              <a:rPr lang="en-US" sz="3600" dirty="0" smtClean="0"/>
+              <a:t>Internet</a:t>
+            </a:r>
+            <a:endParaRPr lang="en-US" sz="3600" dirty="0"/>
+          </a:p>
+        </p:txBody>
+      </p:sp>
+      <p:pic>
+        <p:nvPicPr>
+          <p:cNvPr id="2" name="Picture 1"/>
+          <p:cNvPicPr>
+            <a:picLocks noChangeAspect="1"/>
+          </p:cNvPicPr>
+          <p:nvPr/>
+        </p:nvPicPr>
+        <p:blipFill>
+          <a:blip r:embed="rId5">
+            <a:extLst>
+              <a:ext uri="{28A0092B-C50C-407E-A947-70E740481C1C}">
+                <a14:useLocalDpi xmlns:a14="http://schemas.microsoft.com/office/drawing/2010/main" val="0"/>
+              </a:ext>
+            </a:extLst>
+          </a:blip>
+          <a:stretch>
+            <a:fillRect/>
+          </a:stretch>
+        </p:blipFill>
+        <p:spPr>
+          <a:xfrm>
+            <a:off x="2330687" y="2160974"/>
+            <a:ext cx="2284779" cy="2284779"/>
+          </a:xfrm>
+          <a:prstGeom prst="rect">
+            <a:avLst/>
+          </a:prstGeom>
+        </p:spPr>
+      </p:pic>
+      <p:sp>
+        <p:nvSpPr>
+          <p:cNvPr id="8" name="TextBox 7"/>
+          <p:cNvSpPr txBox="1"/>
+          <p:nvPr/>
+        </p:nvSpPr>
+        <p:spPr>
+          <a:xfrm>
+            <a:off x="2609761" y="3905857"/>
+            <a:ext cx="1612242" cy="646331"/>
+          </a:xfrm>
+          <a:prstGeom prst="rect">
+            <a:avLst/>
+          </a:prstGeom>
+          <a:noFill/>
+        </p:spPr>
+        <p:txBody>
+          <a:bodyPr wrap="square" rtlCol="0">
+            <a:spAutoFit/>
+          </a:bodyPr>
+          <a:lstStyle/>
+          <a:p>
+            <a:r>
+              <a:rPr lang="en-US" sz="3600" smtClean="0"/>
+              <a:t>XDN AP</a:t>
+            </a:r>
+            <a:endParaRPr lang="en-US" sz="3600" dirty="0"/>
+          </a:p>
+        </p:txBody>
+      </p:sp>
+      <p:cxnSp>
+        <p:nvCxnSpPr>
+          <p:cNvPr id="6" name="Straight Arrow Connector 5"/>
+          <p:cNvCxnSpPr/>
+          <p:nvPr/>
+        </p:nvCxnSpPr>
+        <p:spPr>
+          <a:xfrm flipV="1">
+            <a:off x="1578301" y="3163358"/>
+            <a:ext cx="863135" cy="140005"/>
+          </a:xfrm>
+          <a:prstGeom prst="straightConnector1">
+            <a:avLst/>
+          </a:prstGeom>
+          <a:ln w="50800">
+            <a:solidFill>
+              <a:schemeClr val="tx1"/>
+            </a:solidFill>
+            <a:prstDash val="dash"/>
+            <a:headEnd type="stealth" w="lg" len="lg"/>
+            <a:tailEnd type="stealth" w="lg" len="lg"/>
+          </a:ln>
+        </p:spPr>
+        <p:style>
+          <a:lnRef idx="1">
+            <a:schemeClr val="accent1"/>
+          </a:lnRef>
+          <a:fillRef idx="0">
+            <a:schemeClr val="accent1"/>
+          </a:fillRef>
+          <a:effectRef idx="0">
+            <a:schemeClr val="accent1"/>
+          </a:effectRef>
+          <a:fontRef idx="minor">
+            <a:schemeClr val="tx1"/>
+          </a:fontRef>
+        </p:style>
+      </p:cxnSp>
+      <p:cxnSp>
+        <p:nvCxnSpPr>
+          <p:cNvPr id="20" name="Straight Arrow Connector 19"/>
+          <p:cNvCxnSpPr>
+            <a:endCxn id="5" idx="1"/>
+          </p:cNvCxnSpPr>
+          <p:nvPr/>
+        </p:nvCxnSpPr>
+        <p:spPr>
+          <a:xfrm>
+            <a:off x="4985121" y="3042745"/>
+            <a:ext cx="3350496" cy="18505"/>
+          </a:xfrm>
+          <a:prstGeom prst="straightConnector1">
+            <a:avLst/>
+          </a:prstGeom>
+          <a:ln w="50800">
+            <a:solidFill>
+              <a:schemeClr val="tx1"/>
+            </a:solidFill>
+            <a:prstDash val="solid"/>
+            <a:headEnd type="stealth" w="lg" len="lg"/>
+            <a:tailEnd type="stealth" w="lg" len="lg"/>
+          </a:ln>
+        </p:spPr>
+        <p:style>
+          <a:lnRef idx="1">
+            <a:schemeClr val="accent1"/>
+          </a:lnRef>
+          <a:fillRef idx="0">
+            <a:schemeClr val="accent1"/>
+          </a:fillRef>
+          <a:effectRef idx="0">
+            <a:schemeClr val="accent1"/>
+          </a:effectRef>
+          <a:fontRef idx="minor">
+            <a:schemeClr val="tx1"/>
+          </a:fontRef>
+        </p:style>
+      </p:cxnSp>
+    </p:spTree>
+    <p:extLst>
+      <p:ext uri="{BB962C8B-B14F-4D97-AF65-F5344CB8AC3E}">
+        <p14:creationId xmlns:p14="http://schemas.microsoft.com/office/powerpoint/2010/main" val="1439724531"/>
+      </p:ext>
+    </p:extLst>
+  </p:cSld>
+  <p:clrMapOvr>
+    <a:masterClrMapping/>
+  </p:clrMapOvr>
+</p:sld>
+</file>
+
+<file path=ppt/slides/slide4.xml><?xml version="1.0" encoding="utf-8"?>
 <p:sld xmlns:a="http://schemas.openxmlformats.org/drawingml/2006/main" xmlns:r="http://schemas.openxmlformats.org/officeDocument/2006/relationships" xmlns:p="http://schemas.openxmlformats.org/presentationml/2006/main">
   <p:cSld>
     <p:spTree>

</xml_diff>